<commit_message>
added some to competition
</commit_message>
<xml_diff>
--- a/CT6018 Joe Mason s4001719.pptx
+++ b/CT6018 Joe Mason s4001719.pptx
@@ -24471,7 +24471,7 @@
                 <a:latin typeface="Arial" panose="020B0604020202020204" pitchFamily="34" charset="0"/>
                 <a:cs typeface="Arial" panose="020B0604020202020204" pitchFamily="34" charset="0"/>
               </a:rPr>
-              <a:t>Action-based Casual Sandbox</a:t>
+              <a:t>Casual, Action, Arcade, Sandbox</a:t>
             </a:r>
           </a:p>
           <a:p>
@@ -26228,7 +26228,61 @@
             </a:pPr>
             <a:r>
               <a:rPr lang="en-US" dirty="0"/>
-              <a:t>text</a:t>
+              <a:t>from “reflection.io”</a:t>
+            </a:r>
+          </a:p>
+          <a:p>
+            <a:pPr marL="0" indent="0">
+              <a:buNone/>
+            </a:pPr>
+            <a:r>
+              <a:rPr lang="en-US" dirty="0"/>
+              <a:t>“brawlhalla”</a:t>
+            </a:r>
+          </a:p>
+          <a:p>
+            <a:r>
+              <a:rPr lang="en-US" dirty="0"/>
+              <a:t>10m total downloads (free)</a:t>
+            </a:r>
+          </a:p>
+          <a:p>
+            <a:r>
+              <a:rPr lang="en-US" dirty="0"/>
+              <a:t>1.02m new downloads per year</a:t>
+            </a:r>
+          </a:p>
+          <a:p>
+            <a:r>
+              <a:rPr lang="en-US" dirty="0"/>
+              <a:t>£325,000 revenue per year</a:t>
+            </a:r>
+          </a:p>
+          <a:p>
+            <a:pPr marL="0" indent="0">
+              <a:buNone/>
+            </a:pPr>
+            <a:r>
+              <a:rPr lang="en-US" dirty="0"/>
+              <a:t>“terraria”</a:t>
+            </a:r>
+          </a:p>
+          <a:p>
+            <a:r>
+              <a:rPr lang="en-US" dirty="0"/>
+              <a:t>1m total downloads (£4.59)</a:t>
+            </a:r>
+          </a:p>
+          <a:p>
+            <a:r>
+              <a:rPr lang="en-US" dirty="0"/>
+              <a:t>240k new downloads per year</a:t>
+            </a:r>
+          </a:p>
+          <a:p>
+            <a:r>
+              <a:rPr lang="en-US" dirty="0"/>
+              <a:t>£465,000 revenue per year</a:t>
             </a:r>
           </a:p>
         </p:txBody>
@@ -29956,6 +30010,15 @@
 </file>
 
 <file path=customXml/item1.xml><?xml version="1.0" encoding="utf-8"?>
+<?mso-contentType ?>
+<FormTemplates xmlns="http://schemas.microsoft.com/sharepoint/v3/contenttype/forms">
+  <Display>DocumentLibraryForm</Display>
+  <Edit>DocumentLibraryForm</Edit>
+  <New>DocumentLibraryForm</New>
+</FormTemplates>
+</file>
+
+<file path=customXml/item2.xml><?xml version="1.0" encoding="utf-8"?>
 <p:properties xmlns:p="http://schemas.microsoft.com/office/2006/metadata/properties" xmlns:xsi="http://www.w3.org/2001/XMLSchema-instance" xmlns:pc="http://schemas.microsoft.com/office/infopath/2007/PartnerControls">
   <documentManagement>
     <Status xmlns="71af3243-3dd4-4a8d-8c0d-dd76da1f02a5">Not started</Status>
@@ -29972,15 +30035,6 @@
     <MediaServiceKeyPoints xmlns="71af3243-3dd4-4a8d-8c0d-dd76da1f02a5" xsi:nil="true"/>
   </documentManagement>
 </p:properties>
-</file>
-
-<file path=customXml/item2.xml><?xml version="1.0" encoding="utf-8"?>
-<?mso-contentType ?>
-<FormTemplates xmlns="http://schemas.microsoft.com/sharepoint/v3/contenttype/forms">
-  <Display>DocumentLibraryForm</Display>
-  <Edit>DocumentLibraryForm</Edit>
-  <New>DocumentLibraryForm</New>
-</FormTemplates>
 </file>
 
 <file path=customXml/item3.xml><?xml version="1.0" encoding="utf-8"?>
@@ -30260,6 +30314,14 @@
 </file>
 
 <file path=customXml/itemProps1.xml><?xml version="1.0" encoding="utf-8"?>
+<ds:datastoreItem xmlns:ds="http://schemas.openxmlformats.org/officeDocument/2006/customXml" ds:itemID="{A5CCB28C-7D26-4A36-9CFC-D739C28F3D18}">
+  <ds:schemaRefs>
+    <ds:schemaRef ds:uri="http://schemas.microsoft.com/sharepoint/v3/contenttype/forms"/>
+  </ds:schemaRefs>
+</ds:datastoreItem>
+</file>
+
+<file path=customXml/itemProps2.xml><?xml version="1.0" encoding="utf-8"?>
 <ds:datastoreItem xmlns:ds="http://schemas.openxmlformats.org/officeDocument/2006/customXml" ds:itemID="{08757C30-AE9A-4680-90EB-19D282EC2B7C}">
   <ds:schemaRefs>
     <ds:schemaRef ds:uri="http://schemas.microsoft.com/office/2006/metadata/properties"/>
@@ -30267,14 +30329,6 @@
     <ds:schemaRef ds:uri="71af3243-3dd4-4a8d-8c0d-dd76da1f02a5"/>
     <ds:schemaRef ds:uri="http://schemas.microsoft.com/sharepoint/v3"/>
     <ds:schemaRef ds:uri="230e9df3-be65-4c73-a93b-d1236ebd677e"/>
-  </ds:schemaRefs>
-</ds:datastoreItem>
-</file>
-
-<file path=customXml/itemProps2.xml><?xml version="1.0" encoding="utf-8"?>
-<ds:datastoreItem xmlns:ds="http://schemas.openxmlformats.org/officeDocument/2006/customXml" ds:itemID="{A5CCB28C-7D26-4A36-9CFC-D739C28F3D18}">
-  <ds:schemaRefs>
-    <ds:schemaRef ds:uri="http://schemas.microsoft.com/sharepoint/v3/contenttype/forms"/>
   </ds:schemaRefs>
 </ds:datastoreItem>
 </file>

</xml_diff>

<commit_message>
Update CT6018 Joe Mason s4001719.pptx
</commit_message>
<xml_diff>
--- a/CT6018 Joe Mason s4001719.pptx
+++ b/CT6018 Joe Mason s4001719.pptx
@@ -16,9 +16,9 @@
     <p:sldId id="267" r:id="rId7"/>
     <p:sldId id="277" r:id="rId8"/>
     <p:sldId id="292" r:id="rId9"/>
-    <p:sldId id="279" r:id="rId10"/>
-    <p:sldId id="293" r:id="rId11"/>
-    <p:sldId id="280" r:id="rId12"/>
+    <p:sldId id="280" r:id="rId10"/>
+    <p:sldId id="279" r:id="rId11"/>
+    <p:sldId id="293" r:id="rId12"/>
     <p:sldId id="281" r:id="rId13"/>
     <p:sldId id="282" r:id="rId14"/>
     <p:sldId id="283" r:id="rId15"/>
@@ -3885,7 +3885,7 @@
           </a:pPr>
           <a:r>
             <a:rPr lang="en-US" sz="1800" b="0" i="0" dirty="0"/>
-            <a:t>Development planning, finalizing design</a:t>
+            <a:t>Development planning, finalising design</a:t>
           </a:r>
           <a:endParaRPr lang="en-US" sz="1800" dirty="0">
             <a:latin typeface="Calibri" charset="0"/>
@@ -5966,7 +5966,7 @@
           </a:pPr>
           <a:r>
             <a:rPr lang="en-US" sz="1800" b="0" i="0" kern="1200" dirty="0"/>
-            <a:t>Development planning, finalizing design</a:t>
+            <a:t>Development planning, finalising design</a:t>
           </a:r>
           <a:endParaRPr lang="en-US" sz="1800" kern="1200" dirty="0">
             <a:latin typeface="Calibri" charset="0"/>
@@ -19731,7 +19731,6 @@
           </a:bodyPr>
           <a:lstStyle/>
           <a:p>
-            <a:pPr algn="l"/>
             <a:r>
               <a:rPr lang="en-US" dirty="0"/>
               <a:t>Engagement</a:t>
@@ -19767,7 +19766,7 @@
           <a:p>
             <a:r>
               <a:rPr lang="en-US" dirty="0"/>
-              <a:t>Push notifications</a:t>
+              <a:t>Subtitle</a:t>
             </a:r>
           </a:p>
         </p:txBody>
@@ -19805,7 +19804,7 @@
             </a:pPr>
             <a:r>
               <a:rPr lang="en-US" dirty="0"/>
-              <a:t>Frequent rewards</a:t>
+              <a:t>text</a:t>
             </a:r>
           </a:p>
         </p:txBody>
@@ -21817,7 +21816,7 @@
             <p:ph sz="quarter" idx="14"/>
             <p:extLst>
               <p:ext uri="{D42A27DB-BD31-4B8C-83A1-F6EECF244321}">
-                <p14:modId xmlns:p14="http://schemas.microsoft.com/office/powerpoint/2010/main" val="3434726138"/>
+                <p14:modId xmlns:p14="http://schemas.microsoft.com/office/powerpoint/2010/main" val="1196551151"/>
               </p:ext>
             </p:extLst>
           </p:nvPr>
@@ -21980,7 +21979,7 @@
             <p:ph sz="quarter" idx="14"/>
             <p:extLst>
               <p:ext uri="{D42A27DB-BD31-4B8C-83A1-F6EECF244321}">
-                <p14:modId xmlns:p14="http://schemas.microsoft.com/office/powerpoint/2010/main" val="1718924170"/>
+                <p14:modId xmlns:p14="http://schemas.microsoft.com/office/powerpoint/2010/main" val="1010444478"/>
               </p:ext>
             </p:extLst>
           </p:nvPr>
@@ -22048,7 +22047,7 @@
                       <a:pPr algn="ctr"/>
                       <a:r>
                         <a:rPr lang="en-US" b="1" dirty="0"/>
-                        <a:t>Year</a:t>
+                        <a:t>Year End</a:t>
                       </a:r>
                     </a:p>
                   </a:txBody>
@@ -22210,7 +22209,7 @@
                     <a:p>
                       <a:r>
                         <a:rPr lang="en-US" dirty="0"/>
-                        <a:t>11%</a:t>
+                        <a:t>5%</a:t>
                       </a:r>
                     </a:p>
                   </a:txBody>
@@ -22296,7 +22295,7 @@
                     <a:p>
                       <a:r>
                         <a:rPr lang="en-US" dirty="0"/>
-                        <a:t>9%</a:t>
+                        <a:t>4%</a:t>
                       </a:r>
                     </a:p>
                   </a:txBody>
@@ -22382,7 +22381,7 @@
                     <a:p>
                       <a:r>
                         <a:rPr lang="en-US" dirty="0"/>
-                        <a:t>8%</a:t>
+                        <a:t>3%</a:t>
                       </a:r>
                     </a:p>
                   </a:txBody>
@@ -22468,7 +22467,7 @@
                     <a:p>
                       <a:r>
                         <a:rPr lang="en-US" dirty="0"/>
-                        <a:t>8%</a:t>
+                        <a:t>3%</a:t>
                       </a:r>
                     </a:p>
                   </a:txBody>
@@ -22706,11 +22705,16 @@
           </p:cNvGraphicFramePr>
           <p:nvPr>
             <p:ph sz="quarter" idx="14"/>
+            <p:extLst>
+              <p:ext uri="{D42A27DB-BD31-4B8C-83A1-F6EECF244321}">
+                <p14:modId xmlns:p14="http://schemas.microsoft.com/office/powerpoint/2010/main" val="2636604029"/>
+              </p:ext>
+            </p:extLst>
           </p:nvPr>
         </p:nvGraphicFramePr>
         <p:xfrm>
-          <a:off x="3422650" y="996950"/>
-          <a:ext cx="8368870" cy="4544290"/>
+          <a:off x="5243701" y="251840"/>
+          <a:ext cx="5021322" cy="6101970"/>
         </p:xfrm>
         <a:graphic>
           <a:graphicData uri="http://schemas.openxmlformats.org/drawingml/2006/table">
@@ -22719,44 +22723,51 @@
                 <a:tableStyleId>{8799B23B-EC83-4686-B30A-512413B5E67A}</a:tableStyleId>
               </a:tblPr>
               <a:tblGrid>
-                <a:gridCol w="1673774">
+                <a:gridCol w="836887">
                   <a:extLst>
                     <a:ext uri="{9D8B030D-6E8A-4147-A177-3AD203B41FA5}">
                       <a16:colId xmlns:a16="http://schemas.microsoft.com/office/drawing/2014/main" val="1517755082"/>
                     </a:ext>
                   </a:extLst>
                 </a:gridCol>
-                <a:gridCol w="1673774">
+                <a:gridCol w="836887">
+                  <a:extLst>
+                    <a:ext uri="{9D8B030D-6E8A-4147-A177-3AD203B41FA5}">
+                      <a16:colId xmlns:a16="http://schemas.microsoft.com/office/drawing/2014/main" val="3487105871"/>
+                    </a:ext>
+                  </a:extLst>
+                </a:gridCol>
+                <a:gridCol w="836887">
                   <a:extLst>
                     <a:ext uri="{9D8B030D-6E8A-4147-A177-3AD203B41FA5}">
                       <a16:colId xmlns:a16="http://schemas.microsoft.com/office/drawing/2014/main" val="2446386500"/>
                     </a:ext>
                   </a:extLst>
                 </a:gridCol>
-                <a:gridCol w="1673774">
+                <a:gridCol w="836887">
+                  <a:extLst>
+                    <a:ext uri="{9D8B030D-6E8A-4147-A177-3AD203B41FA5}">
+                      <a16:colId xmlns:a16="http://schemas.microsoft.com/office/drawing/2014/main" val="3653984742"/>
+                    </a:ext>
+                  </a:extLst>
+                </a:gridCol>
+                <a:gridCol w="836887">
                   <a:extLst>
                     <a:ext uri="{9D8B030D-6E8A-4147-A177-3AD203B41FA5}">
                       <a16:colId xmlns:a16="http://schemas.microsoft.com/office/drawing/2014/main" val="3308918160"/>
                     </a:ext>
                   </a:extLst>
                 </a:gridCol>
-                <a:gridCol w="1673774">
+                <a:gridCol w="836887">
                   <a:extLst>
                     <a:ext uri="{9D8B030D-6E8A-4147-A177-3AD203B41FA5}">
-                      <a16:colId xmlns:a16="http://schemas.microsoft.com/office/drawing/2014/main" val="1854486728"/>
-                    </a:ext>
-                  </a:extLst>
-                </a:gridCol>
-                <a:gridCol w="1673774">
-                  <a:extLst>
-                    <a:ext uri="{9D8B030D-6E8A-4147-A177-3AD203B41FA5}">
-                      <a16:colId xmlns:a16="http://schemas.microsoft.com/office/drawing/2014/main" val="1808496511"/>
+                      <a16:colId xmlns:a16="http://schemas.microsoft.com/office/drawing/2014/main" val="3257071900"/>
                     </a:ext>
                   </a:extLst>
                 </a:gridCol>
               </a:tblGrid>
-              <a:tr h="908858">
-                <a:tc>
+              <a:tr h="610197">
+                <a:tc rowSpan="2" gridSpan="2">
                   <a:txBody>
                     <a:bodyPr/>
                     <a:lstStyle/>
@@ -22766,6 +22777,16 @@
                     </a:p>
                   </a:txBody>
                   <a:tcPr anchor="ctr"/>
+                </a:tc>
+                <a:tc rowSpan="2" hMerge="1">
+                  <a:txBody>
+                    <a:bodyPr/>
+                    <a:lstStyle/>
+                    <a:p>
+                      <a:endParaRPr lang="en-GB"/>
+                    </a:p>
+                  </a:txBody>
+                  <a:tcPr/>
                 </a:tc>
                 <a:tc>
                   <a:txBody>
@@ -22779,7 +22800,7 @@
                             <a:schemeClr val="accent3"/>
                           </a:solidFill>
                         </a:rPr>
-                        <a:t>Category 1</a:t>
+                        <a:t>1</a:t>
                       </a:r>
                       <a:endParaRPr lang="en-US" sz="1800" b="1" dirty="0">
                         <a:solidFill>
@@ -22802,9 +22823,85 @@
                           <a:solidFill>
                             <a:schemeClr val="accent3"/>
                           </a:solidFill>
+                          <a:latin typeface="+mj-lt"/>
                         </a:rPr>
-                        <a:t>Category 2</a:t>
+                        <a:t>2</a:t>
                       </a:r>
+                    </a:p>
+                  </a:txBody>
+                  <a:tcPr anchor="ctr"/>
+                </a:tc>
+                <a:tc>
+                  <a:txBody>
+                    <a:bodyPr/>
+                    <a:lstStyle/>
+                    <a:p>
+                      <a:pPr algn="l"/>
+                      <a:r>
+                        <a:rPr lang="en-US" sz="1800" b="1" dirty="0">
+                          <a:solidFill>
+                            <a:schemeClr val="accent3"/>
+                          </a:solidFill>
+                          <a:latin typeface="+mj-lt"/>
+                        </a:rPr>
+                        <a:t>3</a:t>
+                      </a:r>
+                    </a:p>
+                  </a:txBody>
+                  <a:tcPr anchor="ctr"/>
+                </a:tc>
+                <a:tc>
+                  <a:txBody>
+                    <a:bodyPr/>
+                    <a:lstStyle/>
+                    <a:p>
+                      <a:pPr algn="l"/>
+                      <a:r>
+                        <a:rPr lang="en-US" sz="1800" b="1" dirty="0">
+                          <a:solidFill>
+                            <a:schemeClr val="accent3"/>
+                          </a:solidFill>
+                          <a:latin typeface="+mj-lt"/>
+                        </a:rPr>
+                        <a:t>4</a:t>
+                      </a:r>
+                    </a:p>
+                  </a:txBody>
+                  <a:tcPr anchor="ctr"/>
+                </a:tc>
+                <a:extLst>
+                  <a:ext uri="{0D108BD9-81ED-4DB2-BD59-A6C34878D82A}">
+                    <a16:rowId xmlns:a16="http://schemas.microsoft.com/office/drawing/2014/main" val="3100351803"/>
+                  </a:ext>
+                </a:extLst>
+              </a:tr>
+              <a:tr h="610197">
+                <a:tc gridSpan="2" vMerge="1">
+                  <a:txBody>
+                    <a:bodyPr/>
+                    <a:lstStyle/>
+                    <a:p>
+                      <a:endParaRPr lang="en-GB"/>
+                    </a:p>
+                  </a:txBody>
+                  <a:tcPr/>
+                </a:tc>
+                <a:tc hMerge="1" vMerge="1">
+                  <a:txBody>
+                    <a:bodyPr/>
+                    <a:lstStyle/>
+                    <a:p>
+                      <a:endParaRPr lang="en-GB"/>
+                    </a:p>
+                  </a:txBody>
+                  <a:tcPr/>
+                </a:tc>
+                <a:tc>
+                  <a:txBody>
+                    <a:bodyPr/>
+                    <a:lstStyle/>
+                    <a:p>
+                      <a:pPr algn="l"/>
                       <a:endParaRPr lang="en-US" sz="1800" b="1" dirty="0">
                         <a:solidFill>
                           <a:schemeClr val="accent3"/>
@@ -22821,14 +22918,6 @@
                     <a:lstStyle/>
                     <a:p>
                       <a:pPr algn="l"/>
-                      <a:r>
-                        <a:rPr lang="en-US" sz="1800" b="1" dirty="0">
-                          <a:solidFill>
-                            <a:schemeClr val="accent3"/>
-                          </a:solidFill>
-                        </a:rPr>
-                        <a:t>Category 3</a:t>
-                      </a:r>
                       <a:endParaRPr lang="en-US" sz="1800" b="1" dirty="0">
                         <a:solidFill>
                           <a:schemeClr val="accent3"/>
@@ -22845,15 +22934,23 @@
                     <a:lstStyle/>
                     <a:p>
                       <a:pPr algn="l"/>
-                      <a:r>
-                        <a:rPr lang="en-US" sz="1800" b="1" i="0" dirty="0">
-                          <a:solidFill>
-                            <a:schemeClr val="accent3"/>
-                          </a:solidFill>
-                        </a:rPr>
-                        <a:t>Category 4</a:t>
-                      </a:r>
-                      <a:endParaRPr lang="en-US" sz="1800" b="1" i="0" dirty="0">
+                      <a:endParaRPr lang="en-US" sz="1800" b="1" dirty="0">
+                        <a:solidFill>
+                          <a:schemeClr val="accent3"/>
+                        </a:solidFill>
+                        <a:latin typeface="+mj-lt"/>
+                      </a:endParaRPr>
+                    </a:p>
+                  </a:txBody>
+                  <a:tcPr anchor="ctr"/>
+                </a:tc>
+                <a:tc>
+                  <a:txBody>
+                    <a:bodyPr/>
+                    <a:lstStyle/>
+                    <a:p>
+                      <a:pPr algn="l"/>
+                      <a:endParaRPr lang="en-US" sz="1800" b="1" dirty="0">
                         <a:solidFill>
                           <a:schemeClr val="accent3"/>
                         </a:solidFill>
@@ -22865,11 +22962,11 @@
                 </a:tc>
                 <a:extLst>
                   <a:ext uri="{0D108BD9-81ED-4DB2-BD59-A6C34878D82A}">
-                    <a16:rowId xmlns:a16="http://schemas.microsoft.com/office/drawing/2014/main" val="3100351803"/>
+                    <a16:rowId xmlns:a16="http://schemas.microsoft.com/office/drawing/2014/main" val="3611474336"/>
                   </a:ext>
                 </a:extLst>
               </a:tr>
-              <a:tr h="908858">
+              <a:tr h="610197">
                 <a:tc>
                   <a:txBody>
                     <a:bodyPr/>
@@ -22877,7 +22974,7 @@
                     <a:p>
                       <a:r>
                         <a:rPr lang="en-US" dirty="0"/>
-                        <a:t>Item 1</a:t>
+                        <a:t>1</a:t>
                       </a:r>
                     </a:p>
                   </a:txBody>
@@ -22888,10 +22985,7 @@
                     <a:bodyPr/>
                     <a:lstStyle/>
                     <a:p>
-                      <a:r>
-                        <a:rPr lang="en-US" dirty="0"/>
-                        <a:t>4.5</a:t>
-                      </a:r>
+                      <a:endParaRPr lang="en-US" dirty="0"/>
                     </a:p>
                   </a:txBody>
                   <a:tcPr anchor="ctr"/>
@@ -22901,10 +22995,7 @@
                     <a:bodyPr/>
                     <a:lstStyle/>
                     <a:p>
-                      <a:r>
-                        <a:rPr lang="en-US" dirty="0"/>
-                        <a:t>2.3</a:t>
-                      </a:r>
+                      <a:endParaRPr lang="en-US" dirty="0"/>
                     </a:p>
                   </a:txBody>
                   <a:tcPr anchor="ctr"/>
@@ -22914,10 +23005,7 @@
                     <a:bodyPr/>
                     <a:lstStyle/>
                     <a:p>
-                      <a:r>
-                        <a:rPr lang="en-US" dirty="0"/>
-                        <a:t>1.7</a:t>
-                      </a:r>
+                      <a:endParaRPr lang="en-US" dirty="0"/>
                     </a:p>
                   </a:txBody>
                   <a:tcPr anchor="ctr"/>
@@ -22927,14 +23015,16 @@
                     <a:bodyPr/>
                     <a:lstStyle/>
                     <a:p>
-                      <a:r>
-                        <a:rPr lang="en-US" dirty="0"/>
-                        <a:t>5</a:t>
-                      </a:r>
-                      <a:r>
-                        <a:rPr lang="en-US" sz="1800" dirty="0"/>
-                        <a:t>.0</a:t>
-                      </a:r>
+                      <a:endParaRPr lang="en-US" dirty="0"/>
+                    </a:p>
+                  </a:txBody>
+                  <a:tcPr anchor="ctr"/>
+                </a:tc>
+                <a:tc>
+                  <a:txBody>
+                    <a:bodyPr/>
+                    <a:lstStyle/>
+                    <a:p>
                       <a:endParaRPr lang="en-US" dirty="0"/>
                     </a:p>
                   </a:txBody>
@@ -22946,7 +23036,7 @@
                   </a:ext>
                 </a:extLst>
               </a:tr>
-              <a:tr h="908858">
+              <a:tr h="610197">
                 <a:tc>
                   <a:txBody>
                     <a:bodyPr/>
@@ -22954,7 +23044,7 @@
                     <a:p>
                       <a:r>
                         <a:rPr lang="en-US" dirty="0"/>
-                        <a:t>Item 2</a:t>
+                        <a:t>2</a:t>
                       </a:r>
                     </a:p>
                   </a:txBody>
@@ -22965,9 +23055,66 @@
                     <a:bodyPr/>
                     <a:lstStyle/>
                     <a:p>
+                      <a:endParaRPr lang="en-US" dirty="0"/>
+                    </a:p>
+                  </a:txBody>
+                  <a:tcPr anchor="ctr"/>
+                </a:tc>
+                <a:tc>
+                  <a:txBody>
+                    <a:bodyPr/>
+                    <a:lstStyle/>
+                    <a:p>
+                      <a:endParaRPr lang="en-US" dirty="0"/>
+                    </a:p>
+                  </a:txBody>
+                  <a:tcPr anchor="ctr"/>
+                </a:tc>
+                <a:tc>
+                  <a:txBody>
+                    <a:bodyPr/>
+                    <a:lstStyle/>
+                    <a:p>
+                      <a:endParaRPr lang="en-US" dirty="0"/>
+                    </a:p>
+                  </a:txBody>
+                  <a:tcPr anchor="ctr"/>
+                </a:tc>
+                <a:tc>
+                  <a:txBody>
+                    <a:bodyPr/>
+                    <a:lstStyle/>
+                    <a:p>
+                      <a:endParaRPr lang="en-US" dirty="0"/>
+                    </a:p>
+                  </a:txBody>
+                  <a:tcPr anchor="ctr"/>
+                </a:tc>
+                <a:tc>
+                  <a:txBody>
+                    <a:bodyPr/>
+                    <a:lstStyle/>
+                    <a:p>
+                      <a:endParaRPr lang="en-US" dirty="0"/>
+                    </a:p>
+                  </a:txBody>
+                  <a:tcPr anchor="ctr"/>
+                </a:tc>
+                <a:extLst>
+                  <a:ext uri="{0D108BD9-81ED-4DB2-BD59-A6C34878D82A}">
+                    <a16:rowId xmlns:a16="http://schemas.microsoft.com/office/drawing/2014/main" val="604734159"/>
+                  </a:ext>
+                </a:extLst>
+              </a:tr>
+              <a:tr h="610197">
+                <a:tc>
+                  <a:txBody>
+                    <a:bodyPr/>
+                    <a:lstStyle/>
+                    <a:p>
                       <a:r>
                         <a:rPr lang="en-US" dirty="0"/>
-                        <a:t>3.2</a:t>
+                        <a:t>3</a:t>
                       </a:r>
                     </a:p>
                   </a:txBody>
@@ -22978,10 +23125,7 @@
                     <a:bodyPr/>
                     <a:lstStyle/>
                     <a:p>
-                      <a:r>
-                        <a:rPr lang="en-US" dirty="0"/>
-                        <a:t>5.1</a:t>
-                      </a:r>
+                      <a:endParaRPr lang="en-US" dirty="0"/>
                     </a:p>
                   </a:txBody>
                   <a:tcPr anchor="ctr"/>
@@ -22991,10 +23135,7 @@
                     <a:bodyPr/>
                     <a:lstStyle/>
                     <a:p>
-                      <a:r>
-                        <a:rPr lang="en-US" dirty="0"/>
-                        <a:t>4.4</a:t>
-                      </a:r>
+                      <a:endParaRPr lang="en-US" dirty="0"/>
                     </a:p>
                   </a:txBody>
                   <a:tcPr anchor="ctr"/>
@@ -23004,14 +23145,26 @@
                     <a:bodyPr/>
                     <a:lstStyle/>
                     <a:p>
-                      <a:r>
-                        <a:rPr lang="en-US" dirty="0"/>
-                        <a:t>3</a:t>
-                      </a:r>
-                      <a:r>
-                        <a:rPr lang="en-US" sz="1800" dirty="0"/>
-                        <a:t>.0</a:t>
-                      </a:r>
+                      <a:endParaRPr lang="en-US" dirty="0"/>
+                    </a:p>
+                  </a:txBody>
+                  <a:tcPr anchor="ctr"/>
+                </a:tc>
+                <a:tc>
+                  <a:txBody>
+                    <a:bodyPr/>
+                    <a:lstStyle/>
+                    <a:p>
+                      <a:endParaRPr lang="en-US" dirty="0"/>
+                    </a:p>
+                  </a:txBody>
+                  <a:tcPr anchor="ctr"/>
+                </a:tc>
+                <a:tc>
+                  <a:txBody>
+                    <a:bodyPr/>
+                    <a:lstStyle/>
+                    <a:p>
                       <a:endParaRPr lang="en-US" dirty="0"/>
                     </a:p>
                   </a:txBody>
@@ -23023,7 +23176,7 @@
                   </a:ext>
                 </a:extLst>
               </a:tr>
-              <a:tr h="908858">
+              <a:tr h="610197">
                 <a:tc>
                   <a:txBody>
                     <a:bodyPr/>
@@ -23031,7 +23184,7 @@
                     <a:p>
                       <a:r>
                         <a:rPr lang="en-US" dirty="0"/>
-                        <a:t>Item 3</a:t>
+                        <a:t>4</a:t>
                       </a:r>
                     </a:p>
                   </a:txBody>
@@ -23042,9 +23195,66 @@
                     <a:bodyPr/>
                     <a:lstStyle/>
                     <a:p>
+                      <a:endParaRPr lang="en-US" dirty="0"/>
+                    </a:p>
+                  </a:txBody>
+                  <a:tcPr anchor="ctr"/>
+                </a:tc>
+                <a:tc>
+                  <a:txBody>
+                    <a:bodyPr/>
+                    <a:lstStyle/>
+                    <a:p>
+                      <a:endParaRPr lang="en-US" dirty="0"/>
+                    </a:p>
+                  </a:txBody>
+                  <a:tcPr anchor="ctr"/>
+                </a:tc>
+                <a:tc>
+                  <a:txBody>
+                    <a:bodyPr/>
+                    <a:lstStyle/>
+                    <a:p>
+                      <a:endParaRPr lang="en-US" dirty="0"/>
+                    </a:p>
+                  </a:txBody>
+                  <a:tcPr anchor="ctr"/>
+                </a:tc>
+                <a:tc>
+                  <a:txBody>
+                    <a:bodyPr/>
+                    <a:lstStyle/>
+                    <a:p>
+                      <a:endParaRPr lang="en-US" dirty="0"/>
+                    </a:p>
+                  </a:txBody>
+                  <a:tcPr anchor="ctr"/>
+                </a:tc>
+                <a:tc>
+                  <a:txBody>
+                    <a:bodyPr/>
+                    <a:lstStyle/>
+                    <a:p>
+                      <a:endParaRPr lang="en-US" dirty="0"/>
+                    </a:p>
+                  </a:txBody>
+                  <a:tcPr anchor="ctr"/>
+                </a:tc>
+                <a:extLst>
+                  <a:ext uri="{0D108BD9-81ED-4DB2-BD59-A6C34878D82A}">
+                    <a16:rowId xmlns:a16="http://schemas.microsoft.com/office/drawing/2014/main" val="488714188"/>
+                  </a:ext>
+                </a:extLst>
+              </a:tr>
+              <a:tr h="610197">
+                <a:tc>
+                  <a:txBody>
+                    <a:bodyPr/>
+                    <a:lstStyle/>
+                    <a:p>
                       <a:r>
                         <a:rPr lang="en-US" dirty="0"/>
-                        <a:t>2.1</a:t>
+                        <a:t>5</a:t>
                       </a:r>
                     </a:p>
                   </a:txBody>
@@ -23055,9 +23265,66 @@
                     <a:bodyPr/>
                     <a:lstStyle/>
                     <a:p>
+                      <a:endParaRPr lang="en-US" dirty="0"/>
+                    </a:p>
+                  </a:txBody>
+                  <a:tcPr anchor="ctr"/>
+                </a:tc>
+                <a:tc>
+                  <a:txBody>
+                    <a:bodyPr/>
+                    <a:lstStyle/>
+                    <a:p>
+                      <a:endParaRPr lang="en-US" dirty="0"/>
+                    </a:p>
+                  </a:txBody>
+                  <a:tcPr anchor="ctr"/>
+                </a:tc>
+                <a:tc>
+                  <a:txBody>
+                    <a:bodyPr/>
+                    <a:lstStyle/>
+                    <a:p>
+                      <a:endParaRPr lang="en-US" dirty="0"/>
+                    </a:p>
+                  </a:txBody>
+                  <a:tcPr anchor="ctr"/>
+                </a:tc>
+                <a:tc>
+                  <a:txBody>
+                    <a:bodyPr/>
+                    <a:lstStyle/>
+                    <a:p>
+                      <a:endParaRPr lang="en-US" dirty="0"/>
+                    </a:p>
+                  </a:txBody>
+                  <a:tcPr anchor="ctr"/>
+                </a:tc>
+                <a:tc>
+                  <a:txBody>
+                    <a:bodyPr/>
+                    <a:lstStyle/>
+                    <a:p>
+                      <a:endParaRPr lang="en-US" dirty="0"/>
+                    </a:p>
+                  </a:txBody>
+                  <a:tcPr anchor="ctr"/>
+                </a:tc>
+                <a:extLst>
+                  <a:ext uri="{0D108BD9-81ED-4DB2-BD59-A6C34878D82A}">
+                    <a16:rowId xmlns:a16="http://schemas.microsoft.com/office/drawing/2014/main" val="3923311043"/>
+                  </a:ext>
+                </a:extLst>
+              </a:tr>
+              <a:tr h="610197">
+                <a:tc>
+                  <a:txBody>
+                    <a:bodyPr/>
+                    <a:lstStyle/>
+                    <a:p>
                       <a:r>
                         <a:rPr lang="en-US" dirty="0"/>
-                        <a:t>1.7</a:t>
+                        <a:t>6</a:t>
                       </a:r>
                     </a:p>
                   </a:txBody>
@@ -23068,9 +23335,66 @@
                     <a:bodyPr/>
                     <a:lstStyle/>
                     <a:p>
+                      <a:endParaRPr lang="en-US" dirty="0"/>
+                    </a:p>
+                  </a:txBody>
+                  <a:tcPr anchor="ctr"/>
+                </a:tc>
+                <a:tc>
+                  <a:txBody>
+                    <a:bodyPr/>
+                    <a:lstStyle/>
+                    <a:p>
+                      <a:endParaRPr lang="en-US" dirty="0"/>
+                    </a:p>
+                  </a:txBody>
+                  <a:tcPr anchor="ctr"/>
+                </a:tc>
+                <a:tc>
+                  <a:txBody>
+                    <a:bodyPr/>
+                    <a:lstStyle/>
+                    <a:p>
+                      <a:endParaRPr lang="en-US" dirty="0"/>
+                    </a:p>
+                  </a:txBody>
+                  <a:tcPr anchor="ctr"/>
+                </a:tc>
+                <a:tc>
+                  <a:txBody>
+                    <a:bodyPr/>
+                    <a:lstStyle/>
+                    <a:p>
+                      <a:endParaRPr lang="en-US" dirty="0"/>
+                    </a:p>
+                  </a:txBody>
+                  <a:tcPr anchor="ctr"/>
+                </a:tc>
+                <a:tc>
+                  <a:txBody>
+                    <a:bodyPr/>
+                    <a:lstStyle/>
+                    <a:p>
+                      <a:endParaRPr lang="en-US" dirty="0"/>
+                    </a:p>
+                  </a:txBody>
+                  <a:tcPr anchor="ctr"/>
+                </a:tc>
+                <a:extLst>
+                  <a:ext uri="{0D108BD9-81ED-4DB2-BD59-A6C34878D82A}">
+                    <a16:rowId xmlns:a16="http://schemas.microsoft.com/office/drawing/2014/main" val="712505685"/>
+                  </a:ext>
+                </a:extLst>
+              </a:tr>
+              <a:tr h="610197">
+                <a:tc>
+                  <a:txBody>
+                    <a:bodyPr/>
+                    <a:lstStyle/>
+                    <a:p>
                       <a:r>
                         <a:rPr lang="en-US" dirty="0"/>
-                        <a:t>2.5</a:t>
+                        <a:t>7</a:t>
                       </a:r>
                     </a:p>
                   </a:txBody>
@@ -23081,21 +23405,58 @@
                     <a:bodyPr/>
                     <a:lstStyle/>
                     <a:p>
-                      <a:r>
-                        <a:rPr lang="en-US" dirty="0"/>
-                        <a:t>2.8</a:t>
-                      </a:r>
+                      <a:endParaRPr lang="en-US" dirty="0"/>
+                    </a:p>
+                  </a:txBody>
+                  <a:tcPr anchor="ctr"/>
+                </a:tc>
+                <a:tc>
+                  <a:txBody>
+                    <a:bodyPr/>
+                    <a:lstStyle/>
+                    <a:p>
+                      <a:endParaRPr lang="en-US" dirty="0"/>
+                    </a:p>
+                  </a:txBody>
+                  <a:tcPr anchor="ctr"/>
+                </a:tc>
+                <a:tc>
+                  <a:txBody>
+                    <a:bodyPr/>
+                    <a:lstStyle/>
+                    <a:p>
+                      <a:endParaRPr lang="en-US" dirty="0"/>
+                    </a:p>
+                  </a:txBody>
+                  <a:tcPr anchor="ctr"/>
+                </a:tc>
+                <a:tc>
+                  <a:txBody>
+                    <a:bodyPr/>
+                    <a:lstStyle/>
+                    <a:p>
+                      <a:endParaRPr lang="en-US" dirty="0"/>
+                    </a:p>
+                  </a:txBody>
+                  <a:tcPr anchor="ctr"/>
+                </a:tc>
+                <a:tc>
+                  <a:txBody>
+                    <a:bodyPr/>
+                    <a:lstStyle/>
+                    <a:p>
+                      <a:endParaRPr lang="en-US" dirty="0"/>
                     </a:p>
                   </a:txBody>
                   <a:tcPr anchor="ctr"/>
                 </a:tc>
                 <a:extLst>
                   <a:ext uri="{0D108BD9-81ED-4DB2-BD59-A6C34878D82A}">
-                    <a16:rowId xmlns:a16="http://schemas.microsoft.com/office/drawing/2014/main" val="3923311043"/>
+                    <a16:rowId xmlns:a16="http://schemas.microsoft.com/office/drawing/2014/main" val="2046739586"/>
                   </a:ext>
                 </a:extLst>
               </a:tr>
-              <a:tr h="908858">
+              <a:tr h="610197">
                 <a:tc>
                   <a:txBody>
                     <a:bodyPr/>
@@ -23103,7 +23464,7 @@
                     <a:p>
                       <a:r>
                         <a:rPr lang="en-US" dirty="0"/>
-                        <a:t>Item 4</a:t>
+                        <a:t>8</a:t>
                       </a:r>
                     </a:p>
                   </a:txBody>
@@ -23114,10 +23475,7 @@
                     <a:bodyPr/>
                     <a:lstStyle/>
                     <a:p>
-                      <a:r>
-                        <a:rPr lang="en-US" dirty="0"/>
-                        <a:t>4.5</a:t>
-                      </a:r>
+                      <a:endParaRPr lang="en-US" dirty="0"/>
                     </a:p>
                   </a:txBody>
                   <a:tcPr anchor="ctr"/>
@@ -23127,10 +23485,7 @@
                     <a:bodyPr/>
                     <a:lstStyle/>
                     <a:p>
-                      <a:r>
-                        <a:rPr lang="en-US" dirty="0"/>
-                        <a:t>2.2</a:t>
-                      </a:r>
+                      <a:endParaRPr lang="en-US" dirty="0"/>
                     </a:p>
                   </a:txBody>
                   <a:tcPr anchor="ctr"/>
@@ -23140,10 +23495,7 @@
                     <a:bodyPr/>
                     <a:lstStyle/>
                     <a:p>
-                      <a:r>
-                        <a:rPr lang="en-US" dirty="0"/>
-                        <a:t>1.7</a:t>
-                      </a:r>
+                      <a:endParaRPr lang="en-US" dirty="0"/>
                     </a:p>
                   </a:txBody>
                   <a:tcPr anchor="ctr"/>
@@ -23153,14 +23505,16 @@
                     <a:bodyPr/>
                     <a:lstStyle/>
                     <a:p>
-                      <a:r>
-                        <a:rPr lang="en-US" dirty="0"/>
-                        <a:t>7</a:t>
-                      </a:r>
-                      <a:r>
-                        <a:rPr lang="en-US" sz="1800" dirty="0"/>
-                        <a:t>.0</a:t>
-                      </a:r>
+                      <a:endParaRPr lang="en-US" dirty="0"/>
+                    </a:p>
+                  </a:txBody>
+                  <a:tcPr anchor="ctr"/>
+                </a:tc>
+                <a:tc>
+                  <a:txBody>
+                    <a:bodyPr/>
+                    <a:lstStyle/>
+                    <a:p>
                       <a:endParaRPr lang="en-US" dirty="0"/>
                     </a:p>
                   </a:txBody>
@@ -23168,7 +23522,7 @@
                 </a:tc>
                 <a:extLst>
                   <a:ext uri="{0D108BD9-81ED-4DB2-BD59-A6C34878D82A}">
-                    <a16:rowId xmlns:a16="http://schemas.microsoft.com/office/drawing/2014/main" val="2046739586"/>
+                    <a16:rowId xmlns:a16="http://schemas.microsoft.com/office/drawing/2014/main" val="972880320"/>
                   </a:ext>
                 </a:extLst>
               </a:tr>
@@ -24501,7 +24855,7 @@
                 <a:latin typeface="Arial" panose="020B0604020202020204" pitchFamily="34" charset="0"/>
                 <a:cs typeface="Arial" panose="020B0604020202020204" pitchFamily="34" charset="0"/>
               </a:rPr>
-              <a:t>Mine, fight and build to outplay your opponents in fast-paced, real-time battles.</a:t>
+              <a:t>Mine, fight and build to outplay your opponents in fast-paced, real-time battles</a:t>
             </a:r>
           </a:p>
           <a:p>
@@ -24525,7 +24879,7 @@
                 <a:latin typeface="Arial" panose="020B0604020202020204" pitchFamily="34" charset="0"/>
                 <a:cs typeface="Arial" panose="020B0604020202020204" pitchFamily="34" charset="0"/>
               </a:rPr>
-              <a:t>Casual, Action, Arcade, Sandbox</a:t>
+              <a:t>Casual, Action, Sandbox, Platformer</a:t>
             </a:r>
           </a:p>
           <a:p>
@@ -26324,7 +26678,7 @@
           <a:p>
             <a:r>
               <a:rPr lang="en-US" dirty="0"/>
-              <a:t>1m total downloads (£4.59)</a:t>
+              <a:t>1.9m total downloads (£4.59)</a:t>
             </a:r>
           </a:p>
           <a:p>
@@ -26555,10 +26909,10 @@
       </p:grpSpPr>
       <p:sp useBgFill="1">
         <p:nvSpPr>
-          <p:cNvPr id="46" name="Rectangle 45">
+          <p:cNvPr id="30" name="Rectangle 29">
             <a:extLst>
               <a:ext uri="{FF2B5EF4-FFF2-40B4-BE49-F238E27FC236}">
-                <a16:creationId xmlns:a16="http://schemas.microsoft.com/office/drawing/2014/main" id="{DA9750BD-DA78-42B2-B5A4-A84E29984CD9}"/>
+                <a16:creationId xmlns:a16="http://schemas.microsoft.com/office/drawing/2014/main" id="{352D3BCF-5FFD-4370-BBC0-949A4CAEC1CF}"/>
               </a:ext>
               <a:ext uri="{C183D7F6-B498-43B3-948B-1728B52AA6E4}">
                 <adec:decorative xmlns:adec="http://schemas.microsoft.com/office/drawing/2017/decorative" val="1"/>
@@ -26631,10 +26985,10 @@
       </p:sp>
       <p:sp>
         <p:nvSpPr>
-          <p:cNvPr id="48" name="Rectangle 47">
+          <p:cNvPr id="32" name="Rectangle 31">
             <a:extLst>
               <a:ext uri="{FF2B5EF4-FFF2-40B4-BE49-F238E27FC236}">
-                <a16:creationId xmlns:a16="http://schemas.microsoft.com/office/drawing/2014/main" id="{C606A26C-8C0A-411E-BF72-5EE06043487A}"/>
+                <a16:creationId xmlns:a16="http://schemas.microsoft.com/office/drawing/2014/main" id="{5AF7891E-857B-435C-B27A-FAA12E672772}"/>
               </a:ext>
               <a:ext uri="{C183D7F6-B498-43B3-948B-1728B52AA6E4}">
                 <adec:decorative xmlns:adec="http://schemas.microsoft.com/office/drawing/2017/decorative" val="1"/>
@@ -26655,7 +27009,7 @@
         <p:spPr>
           <a:xfrm>
             <a:off x="0" y="0"/>
-            <a:ext cx="3048000" cy="6858000"/>
+            <a:ext cx="12192000" cy="1150467"/>
           </a:xfrm>
           <a:prstGeom prst="rect">
             <a:avLst/>
@@ -26691,10 +27045,10 @@
       </p:sp>
       <p:sp>
         <p:nvSpPr>
-          <p:cNvPr id="41" name="Title 40">
+          <p:cNvPr id="25" name="Title 24">
             <a:extLst>
               <a:ext uri="{FF2B5EF4-FFF2-40B4-BE49-F238E27FC236}">
-                <a16:creationId xmlns:a16="http://schemas.microsoft.com/office/drawing/2014/main" id="{0622F47C-D986-4C50-BD14-2C1E537C27FB}"/>
+                <a16:creationId xmlns:a16="http://schemas.microsoft.com/office/drawing/2014/main" id="{330F6403-11BB-440A-81D1-11DAFA7ABF5D}"/>
               </a:ext>
             </a:extLst>
           </p:cNvPr>
@@ -26707,68 +27061,38 @@
         </p:nvSpPr>
         <p:spPr>
           <a:xfrm>
-            <a:off x="126281" y="637886"/>
-            <a:ext cx="1826375" cy="1567986"/>
+            <a:off x="990599" y="190500"/>
+            <a:ext cx="10336013" cy="773777"/>
           </a:xfrm>
         </p:spPr>
         <p:txBody>
-          <a:bodyPr vert="horz" lIns="91440" tIns="45720" rIns="91440" bIns="45720" rtlCol="0" anchor="t">
+          <a:bodyPr vert="horz" lIns="91440" tIns="45720" rIns="91440" bIns="45720" rtlCol="0" anchor="ctr">
             <a:normAutofit/>
           </a:bodyPr>
           <a:lstStyle/>
           <a:p>
-            <a:pPr algn="l">
+            <a:pPr algn="r">
               <a:lnSpc>
                 <a:spcPct val="90000"/>
               </a:lnSpc>
             </a:pPr>
             <a:r>
-              <a:rPr lang="en-US" sz="2800" spc="-40" dirty="0">
+              <a:rPr lang="en-US" sz="4300" spc="-40" dirty="0">
                 <a:solidFill>
                   <a:srgbClr val="FFFFFF"/>
                 </a:solidFill>
               </a:rPr>
-              <a:t>Market Potential</a:t>
+              <a:t>Unique Selling Point</a:t>
             </a:r>
           </a:p>
         </p:txBody>
       </p:sp>
-      <p:pic>
-        <p:nvPicPr>
-          <p:cNvPr id="27" name="Picture 26">
+      <p:sp>
+        <p:nvSpPr>
+          <p:cNvPr id="4" name="Footer Placeholder 3">
             <a:extLst>
               <a:ext uri="{FF2B5EF4-FFF2-40B4-BE49-F238E27FC236}">
-                <a16:creationId xmlns:a16="http://schemas.microsoft.com/office/drawing/2014/main" id="{33091F32-F283-B9C7-4380-2B1AA98AC228}"/>
-              </a:ext>
-            </a:extLst>
-          </p:cNvPr>
-          <p:cNvPicPr>
-            <a:picLocks noChangeAspect="1"/>
-          </p:cNvPicPr>
-          <p:nvPr/>
-        </p:nvPicPr>
-        <p:blipFill>
-          <a:blip r:embed="rId2"/>
-          <a:stretch>
-            <a:fillRect/>
-          </a:stretch>
-        </p:blipFill>
-        <p:spPr>
-          <a:xfrm>
-            <a:off x="5192927" y="76738"/>
-            <a:ext cx="6490288" cy="3326271"/>
-          </a:xfrm>
-          <a:prstGeom prst="rect">
-            <a:avLst/>
-          </a:prstGeom>
-        </p:spPr>
-      </p:pic>
-      <p:sp>
-        <p:nvSpPr>
-          <p:cNvPr id="2" name="Footer Placeholder 1">
-            <a:extLst>
-              <a:ext uri="{FF2B5EF4-FFF2-40B4-BE49-F238E27FC236}">
-                <a16:creationId xmlns:a16="http://schemas.microsoft.com/office/drawing/2014/main" id="{2C20C49D-5E38-4E7C-A240-4B2D015F3AC7}"/>
+                <a16:creationId xmlns:a16="http://schemas.microsoft.com/office/drawing/2014/main" id="{1C63F48C-BFC1-4227-8BB0-C06C473D6F55}"/>
               </a:ext>
             </a:extLst>
           </p:cNvPr>
@@ -26782,7 +27106,7 @@
         <p:spPr>
           <a:xfrm>
             <a:off x="201168" y="6356350"/>
-            <a:ext cx="2713482" cy="365125"/>
+            <a:ext cx="4837176" cy="365125"/>
           </a:xfrm>
         </p:spPr>
         <p:txBody>
@@ -26799,7 +27123,7 @@
             <a:r>
               <a:rPr lang="en-US" kern="1200" noProof="0">
                 <a:solidFill>
-                  <a:srgbClr val="FFFFFF"/>
+                  <a:schemeClr val="tx1"/>
                 </a:solidFill>
                 <a:latin typeface="+mn-lt"/>
                 <a:ea typeface="+mn-ea"/>
@@ -26815,7 +27139,7 @@
           <p:cNvPr id="3" name="Date Placeholder 2">
             <a:extLst>
               <a:ext uri="{FF2B5EF4-FFF2-40B4-BE49-F238E27FC236}">
-                <a16:creationId xmlns:a16="http://schemas.microsoft.com/office/drawing/2014/main" id="{9CE6D34A-9686-45B2-97D0-AD20167B2D54}"/>
+                <a16:creationId xmlns:a16="http://schemas.microsoft.com/office/drawing/2014/main" id="{1E532E67-6C01-41FF-AA5B-AEEE3DFA51CB}"/>
               </a:ext>
             </a:extLst>
           </p:cNvPr>
@@ -26853,10 +27177,10 @@
       </p:sp>
       <p:sp>
         <p:nvSpPr>
-          <p:cNvPr id="4" name="Slide Number Placeholder 3">
+          <p:cNvPr id="5" name="Slide Number Placeholder 4">
             <a:extLst>
               <a:ext uri="{FF2B5EF4-FFF2-40B4-BE49-F238E27FC236}">
-                <a16:creationId xmlns:a16="http://schemas.microsoft.com/office/drawing/2014/main" id="{AC0EC6D8-4D66-4B16-AD3F-2850D613518A}"/>
+                <a16:creationId xmlns:a16="http://schemas.microsoft.com/office/drawing/2014/main" id="{AA33C4C9-9778-4A59-9001-6EC6F52349CA}"/>
               </a:ext>
             </a:extLst>
           </p:cNvPr>
@@ -26897,215 +27221,44 @@
           </a:p>
         </p:txBody>
       </p:sp>
-      <p:pic>
-        <p:nvPicPr>
-          <p:cNvPr id="30" name="Picture 29">
+      <p:graphicFrame>
+        <p:nvGraphicFramePr>
+          <p:cNvPr id="20" name="Content Placeholder 3">
             <a:extLst>
               <a:ext uri="{FF2B5EF4-FFF2-40B4-BE49-F238E27FC236}">
-                <a16:creationId xmlns:a16="http://schemas.microsoft.com/office/drawing/2014/main" id="{87246A19-C527-A977-2EF3-43FB2869CF04}"/>
+                <a16:creationId xmlns:a16="http://schemas.microsoft.com/office/drawing/2014/main" id="{76386ECC-44D1-4D37-AF78-36503EACC84D}"/>
+              </a:ext>
+              <a:ext uri="{C183D7F6-B498-43B3-948B-1728B52AA6E4}">
+                <adec:decorative xmlns:adec="http://schemas.microsoft.com/office/drawing/2017/decorative" val="1"/>
               </a:ext>
             </a:extLst>
           </p:cNvPr>
-          <p:cNvPicPr>
-            <a:picLocks noChangeAspect="1"/>
-          </p:cNvPicPr>
-          <p:nvPr/>
-        </p:nvPicPr>
-        <p:blipFill>
-          <a:blip r:embed="rId3"/>
-          <a:stretch>
-            <a:fillRect/>
-          </a:stretch>
-        </p:blipFill>
-        <p:spPr>
-          <a:xfrm>
-            <a:off x="1897498" y="0"/>
-            <a:ext cx="1375162" cy="6858000"/>
-          </a:xfrm>
-          <a:prstGeom prst="rect">
-            <a:avLst/>
-          </a:prstGeom>
-        </p:spPr>
-      </p:pic>
-      <p:sp>
-        <p:nvSpPr>
-          <p:cNvPr id="25" name="TextBox 24">
-            <a:extLst>
-              <a:ext uri="{FF2B5EF4-FFF2-40B4-BE49-F238E27FC236}">
-                <a16:creationId xmlns:a16="http://schemas.microsoft.com/office/drawing/2014/main" id="{6FDEE004-1220-7B14-EDF9-5227528EB89D}"/>
-              </a:ext>
-            </a:extLst>
-          </p:cNvPr>
-          <p:cNvSpPr txBox="1"/>
-          <p:nvPr/>
-        </p:nvSpPr>
-        <p:spPr>
-          <a:xfrm>
-            <a:off x="2178523" y="274262"/>
-            <a:ext cx="2697059" cy="2931222"/>
-          </a:xfrm>
-          <a:prstGeom prst="rect">
-            <a:avLst/>
-          </a:prstGeom>
-        </p:spPr>
-        <p:txBody>
-          <a:bodyPr vert="horz" lIns="91440" tIns="45720" rIns="91440" bIns="45720" rtlCol="0">
-            <a:normAutofit/>
-          </a:bodyPr>
-          <a:lstStyle/>
-          <a:p>
-            <a:pPr>
-              <a:lnSpc>
-                <a:spcPct val="110000"/>
-              </a:lnSpc>
-              <a:spcAft>
-                <a:spcPts val="600"/>
-              </a:spcAft>
-            </a:pPr>
-            <a:r>
-              <a:rPr lang="en-US" sz="1600" spc="-20" dirty="0"/>
-              <a:t>Number of Unity games</a:t>
-            </a:r>
-          </a:p>
-          <a:p>
-            <a:pPr>
-              <a:lnSpc>
-                <a:spcPct val="110000"/>
-              </a:lnSpc>
-              <a:spcAft>
-                <a:spcPts val="600"/>
-              </a:spcAft>
-            </a:pPr>
-            <a:r>
-              <a:rPr lang="en-US" sz="1600" spc="-20" dirty="0"/>
-              <a:t>published per genre.</a:t>
-            </a:r>
-          </a:p>
-          <a:p>
-            <a:pPr indent="-228600">
-              <a:lnSpc>
-                <a:spcPct val="110000"/>
-              </a:lnSpc>
-              <a:spcAft>
-                <a:spcPts val="600"/>
-              </a:spcAft>
-              <a:buFont typeface="Arial" panose="020B0604020202020204" pitchFamily="34" charset="0"/>
-              <a:buChar char="•"/>
-            </a:pPr>
-            <a:endParaRPr lang="en-US" sz="1600" spc="-20" dirty="0"/>
-          </a:p>
-          <a:p>
-            <a:pPr indent="-228600">
-              <a:lnSpc>
-                <a:spcPct val="110000"/>
-              </a:lnSpc>
-              <a:spcAft>
-                <a:spcPts val="600"/>
-              </a:spcAft>
-              <a:buFont typeface="Arial" panose="020B0604020202020204" pitchFamily="34" charset="0"/>
-              <a:buChar char="•"/>
-            </a:pPr>
-            <a:r>
-              <a:rPr lang="en-US" sz="1600" spc="-20" dirty="0"/>
-              <a:t>Casual up 53%,</a:t>
-            </a:r>
-          </a:p>
-          <a:p>
-            <a:pPr indent="-228600">
-              <a:lnSpc>
-                <a:spcPct val="110000"/>
-              </a:lnSpc>
-              <a:spcAft>
-                <a:spcPts val="600"/>
-              </a:spcAft>
-              <a:buFont typeface="Arial" panose="020B0604020202020204" pitchFamily="34" charset="0"/>
-              <a:buChar char="•"/>
-            </a:pPr>
-            <a:r>
-              <a:rPr lang="en-US" sz="1600" spc="-20" dirty="0"/>
-              <a:t>Midcore up 54%,</a:t>
-            </a:r>
-          </a:p>
-          <a:p>
-            <a:pPr indent="-228600">
-              <a:lnSpc>
-                <a:spcPct val="110000"/>
-              </a:lnSpc>
-              <a:spcAft>
-                <a:spcPts val="600"/>
-              </a:spcAft>
-              <a:buFont typeface="Arial" panose="020B0604020202020204" pitchFamily="34" charset="0"/>
-              <a:buChar char="•"/>
-            </a:pPr>
-            <a:r>
-              <a:rPr lang="en-US" sz="1600" spc="-20" dirty="0"/>
-              <a:t>Hardcore up 55%,</a:t>
-            </a:r>
-          </a:p>
-          <a:p>
-            <a:pPr indent="-228600">
-              <a:lnSpc>
-                <a:spcPct val="110000"/>
-              </a:lnSpc>
-              <a:spcAft>
-                <a:spcPts val="600"/>
-              </a:spcAft>
-              <a:buFont typeface="Arial" panose="020B0604020202020204" pitchFamily="34" charset="0"/>
-              <a:buChar char="•"/>
-            </a:pPr>
-            <a:r>
-              <a:rPr lang="en-US" sz="1600" spc="-20" dirty="0"/>
-              <a:t>Hyper-casual up 137%</a:t>
-            </a:r>
-          </a:p>
-          <a:p>
-            <a:pPr indent="-228600">
-              <a:lnSpc>
-                <a:spcPct val="110000"/>
-              </a:lnSpc>
-              <a:spcAft>
-                <a:spcPts val="600"/>
-              </a:spcAft>
-              <a:buFont typeface="Arial" panose="020B0604020202020204" pitchFamily="34" charset="0"/>
-              <a:buChar char="•"/>
-            </a:pPr>
-            <a:endParaRPr lang="en-US" spc="-20" dirty="0"/>
-          </a:p>
-        </p:txBody>
-      </p:sp>
-      <p:pic>
-        <p:nvPicPr>
-          <p:cNvPr id="24" name="Picture 23">
-            <a:extLst>
-              <a:ext uri="{FF2B5EF4-FFF2-40B4-BE49-F238E27FC236}">
-                <a16:creationId xmlns:a16="http://schemas.microsoft.com/office/drawing/2014/main" id="{686B98B9-65D3-0B05-EAE9-E9DD49A1B1D7}"/>
-              </a:ext>
-            </a:extLst>
-          </p:cNvPr>
-          <p:cNvPicPr>
-            <a:picLocks noChangeAspect="1"/>
-          </p:cNvPicPr>
-          <p:nvPr/>
-        </p:nvPicPr>
-        <p:blipFill rotWithShape="1">
-          <a:blip r:embed="rId4"/>
-          <a:srcRect t="12296"/>
-          <a:stretch/>
-        </p:blipFill>
-        <p:spPr>
-          <a:xfrm>
-            <a:off x="2047381" y="3386022"/>
-            <a:ext cx="5831841" cy="3375738"/>
-          </a:xfrm>
-          <a:prstGeom prst="rect">
-            <a:avLst/>
-          </a:prstGeom>
-        </p:spPr>
-      </p:pic>
+          <p:cNvGraphicFramePr>
+            <a:graphicFrameLocks noGrp="1"/>
+          </p:cNvGraphicFramePr>
+          <p:nvPr>
+            <p:ph sz="quarter" idx="14"/>
+            <p:extLst>
+              <p:ext uri="{D42A27DB-BD31-4B8C-83A1-F6EECF244321}">
+                <p14:modId xmlns:p14="http://schemas.microsoft.com/office/powerpoint/2010/main" val="1906694569"/>
+              </p:ext>
+            </p:extLst>
+          </p:nvPr>
+        </p:nvGraphicFramePr>
+        <p:xfrm>
+          <a:off x="649288" y="1984375"/>
+          <a:ext cx="10552112" cy="4197350"/>
+        </p:xfrm>
+        <a:graphic>
+          <a:graphicData uri="http://schemas.openxmlformats.org/drawingml/2006/diagram">
+            <dgm:relIds xmlns:dgm="http://schemas.openxmlformats.org/drawingml/2006/diagram" xmlns:r="http://schemas.openxmlformats.org/officeDocument/2006/relationships" r:dm="rId2" r:lo="rId3" r:qs="rId4" r:cs="rId5"/>
+          </a:graphicData>
+        </a:graphic>
+      </p:graphicFrame>
     </p:spTree>
     <p:extLst>
       <p:ext uri="{BB962C8B-B14F-4D97-AF65-F5344CB8AC3E}">
-        <p14:creationId xmlns:p14="http://schemas.microsoft.com/office/powerpoint/2010/main" val="1673587675"/>
+        <p14:creationId xmlns:p14="http://schemas.microsoft.com/office/powerpoint/2010/main" val="1351671334"/>
       </p:ext>
     </p:extLst>
   </p:cSld>
@@ -27498,8 +27651,8 @@
         </p:nvSpPr>
         <p:spPr>
           <a:xfrm>
-            <a:off x="2190994" y="363675"/>
-            <a:ext cx="3318320" cy="3104510"/>
+            <a:off x="2178523" y="274262"/>
+            <a:ext cx="2697059" cy="2931222"/>
           </a:xfrm>
           <a:prstGeom prst="rect">
             <a:avLst/>
@@ -27521,19 +27674,8 @@
             </a:pPr>
             <a:r>
               <a:rPr lang="en-US" sz="1600" spc="-20" dirty="0"/>
-              <a:t>Revenue from in-app purchases and advertisements across regions.</a:t>
+              <a:t>Number of Unity games</a:t>
             </a:r>
-          </a:p>
-          <a:p>
-            <a:pPr>
-              <a:lnSpc>
-                <a:spcPct val="110000"/>
-              </a:lnSpc>
-              <a:spcAft>
-                <a:spcPts val="600"/>
-              </a:spcAft>
-            </a:pPr>
-            <a:endParaRPr lang="en-US" sz="1600" spc="-20" dirty="0"/>
           </a:p>
           <a:p>
             <a:pPr>
@@ -27546,11 +27688,24 @@
             </a:pPr>
             <a:r>
               <a:rPr lang="en-US" sz="1600" spc="-20" dirty="0"/>
-              <a:t>From 2020 to 2021:</a:t>
+              <a:t>published per genre</a:t>
             </a:r>
           </a:p>
           <a:p>
-            <a:pPr marL="285750" indent="-285750">
+            <a:pPr indent="-228600">
+              <a:lnSpc>
+                <a:spcPct val="110000"/>
+              </a:lnSpc>
+              <a:spcAft>
+                <a:spcPts val="600"/>
+              </a:spcAft>
+              <a:buFont typeface="Arial" panose="020B0604020202020204" pitchFamily="34" charset="0"/>
+              <a:buChar char="•"/>
+            </a:pPr>
+            <a:endParaRPr lang="en-US" sz="1600" spc="-20" dirty="0"/>
+          </a:p>
+          <a:p>
+            <a:pPr indent="-228600">
               <a:lnSpc>
                 <a:spcPct val="110000"/>
               </a:lnSpc>
@@ -27562,25 +27717,11 @@
             </a:pPr>
             <a:r>
               <a:rPr lang="en-US" sz="1600" spc="-20" dirty="0"/>
-              <a:t>Total revenue grown by 30%</a:t>
+              <a:t>Casual up 53%,</a:t>
             </a:r>
           </a:p>
           <a:p>
-            <a:pPr>
-              <a:lnSpc>
-                <a:spcPct val="110000"/>
-              </a:lnSpc>
-              <a:spcAft>
-                <a:spcPts val="600"/>
-              </a:spcAft>
-            </a:pPr>
-            <a:r>
-              <a:rPr lang="en-US" sz="1600" spc="-20" dirty="0"/>
-              <a:t>From 2019 to 2021:</a:t>
-            </a:r>
-          </a:p>
-          <a:p>
-            <a:pPr marL="285750" indent="-285750">
+            <a:pPr indent="-228600">
               <a:lnSpc>
                 <a:spcPct val="110000"/>
               </a:lnSpc>
@@ -27592,11 +27733,11 @@
             </a:pPr>
             <a:r>
               <a:rPr lang="en-US" sz="1600" spc="-20" dirty="0"/>
-              <a:t>EU Ad revenue grown by 98%</a:t>
+              <a:t>Midcore up 54%,</a:t>
             </a:r>
           </a:p>
           <a:p>
-            <a:pPr marL="285750" indent="-285750">
+            <a:pPr indent="-228600">
               <a:lnSpc>
                 <a:spcPct val="110000"/>
               </a:lnSpc>
@@ -27608,17 +27749,46 @@
             </a:pPr>
             <a:r>
               <a:rPr lang="en-US" sz="1600" spc="-20" dirty="0"/>
-              <a:t>EU IAP grown by 418%</a:t>
+              <a:t>Hardcore up 55%,</a:t>
             </a:r>
+          </a:p>
+          <a:p>
+            <a:pPr indent="-228600">
+              <a:lnSpc>
+                <a:spcPct val="110000"/>
+              </a:lnSpc>
+              <a:spcAft>
+                <a:spcPts val="600"/>
+              </a:spcAft>
+              <a:buFont typeface="Arial" panose="020B0604020202020204" pitchFamily="34" charset="0"/>
+              <a:buChar char="•"/>
+            </a:pPr>
+            <a:r>
+              <a:rPr lang="en-US" sz="1600" spc="-20" dirty="0"/>
+              <a:t>Hyper-casual up 137%</a:t>
+            </a:r>
+          </a:p>
+          <a:p>
+            <a:pPr indent="-228600">
+              <a:lnSpc>
+                <a:spcPct val="110000"/>
+              </a:lnSpc>
+              <a:spcAft>
+                <a:spcPts val="600"/>
+              </a:spcAft>
+              <a:buFont typeface="Arial" panose="020B0604020202020204" pitchFamily="34" charset="0"/>
+              <a:buChar char="•"/>
+            </a:pPr>
+            <a:endParaRPr lang="en-US" spc="-20" dirty="0"/>
           </a:p>
         </p:txBody>
       </p:sp>
       <p:pic>
         <p:nvPicPr>
-          <p:cNvPr id="7" name="Picture 6">
+          <p:cNvPr id="24" name="Picture 23">
             <a:extLst>
               <a:ext uri="{FF2B5EF4-FFF2-40B4-BE49-F238E27FC236}">
-                <a16:creationId xmlns:a16="http://schemas.microsoft.com/office/drawing/2014/main" id="{181A880E-EED8-078C-7AC8-4F7B918D200A}"/>
+                <a16:creationId xmlns:a16="http://schemas.microsoft.com/office/drawing/2014/main" id="{686B98B9-65D3-0B05-EAE9-E9DD49A1B1D7}"/>
               </a:ext>
             </a:extLst>
           </p:cNvPr>
@@ -27629,13 +27799,13 @@
         </p:nvPicPr>
         <p:blipFill rotWithShape="1">
           <a:blip r:embed="rId3"/>
-          <a:srcRect r="19087"/>
+          <a:srcRect t="12296"/>
           <a:stretch/>
         </p:blipFill>
         <p:spPr>
           <a:xfrm>
-            <a:off x="1952657" y="3561940"/>
-            <a:ext cx="4574344" cy="3202304"/>
+            <a:off x="5931609" y="81031"/>
+            <a:ext cx="5692408" cy="3295028"/>
           </a:xfrm>
           <a:prstGeom prst="rect">
             <a:avLst/>
@@ -27644,10 +27814,10 @@
       </p:pic>
       <p:pic>
         <p:nvPicPr>
-          <p:cNvPr id="9" name="Picture 8">
+          <p:cNvPr id="27" name="Picture 26">
             <a:extLst>
               <a:ext uri="{FF2B5EF4-FFF2-40B4-BE49-F238E27FC236}">
-                <a16:creationId xmlns:a16="http://schemas.microsoft.com/office/drawing/2014/main" id="{BE1F526F-368B-C0AE-D8B3-CCCB4EF0CB64}"/>
+                <a16:creationId xmlns:a16="http://schemas.microsoft.com/office/drawing/2014/main" id="{33091F32-F283-B9C7-4380-2B1AA98AC228}"/>
               </a:ext>
             </a:extLst>
           </p:cNvPr>
@@ -27664,38 +27834,8 @@
         </p:blipFill>
         <p:spPr>
           <a:xfrm>
-            <a:off x="6595793" y="3332637"/>
-            <a:ext cx="5469928" cy="3431606"/>
-          </a:xfrm>
-          <a:prstGeom prst="rect">
-            <a:avLst/>
-          </a:prstGeom>
-        </p:spPr>
-      </p:pic>
-      <p:pic>
-        <p:nvPicPr>
-          <p:cNvPr id="11" name="Picture 10">
-            <a:extLst>
-              <a:ext uri="{FF2B5EF4-FFF2-40B4-BE49-F238E27FC236}">
-                <a16:creationId xmlns:a16="http://schemas.microsoft.com/office/drawing/2014/main" id="{4222A479-805C-BD1F-5299-04E5BCFFEB6F}"/>
-              </a:ext>
-            </a:extLst>
-          </p:cNvPr>
-          <p:cNvPicPr>
-            <a:picLocks noChangeAspect="1"/>
-          </p:cNvPicPr>
-          <p:nvPr/>
-        </p:nvPicPr>
-        <p:blipFill>
-          <a:blip r:embed="rId5"/>
-          <a:stretch>
-            <a:fillRect/>
-          </a:stretch>
-        </p:blipFill>
-        <p:spPr>
-          <a:xfrm>
-            <a:off x="6595793" y="93758"/>
-            <a:ext cx="5469926" cy="3212396"/>
+            <a:off x="3115818" y="3416906"/>
+            <a:ext cx="6634632" cy="3400247"/>
           </a:xfrm>
           <a:prstGeom prst="rect">
             <a:avLst/>
@@ -27705,7 +27845,7 @@
     </p:spTree>
     <p:extLst>
       <p:ext uri="{BB962C8B-B14F-4D97-AF65-F5344CB8AC3E}">
-        <p14:creationId xmlns:p14="http://schemas.microsoft.com/office/powerpoint/2010/main" val="3546298949"/>
+        <p14:creationId xmlns:p14="http://schemas.microsoft.com/office/powerpoint/2010/main" val="1673587675"/>
       </p:ext>
     </p:extLst>
   </p:cSld>
@@ -27742,10 +27882,10 @@
       </p:grpSpPr>
       <p:sp useBgFill="1">
         <p:nvSpPr>
-          <p:cNvPr id="30" name="Rectangle 29">
+          <p:cNvPr id="46" name="Rectangle 45">
             <a:extLst>
               <a:ext uri="{FF2B5EF4-FFF2-40B4-BE49-F238E27FC236}">
-                <a16:creationId xmlns:a16="http://schemas.microsoft.com/office/drawing/2014/main" id="{352D3BCF-5FFD-4370-BBC0-949A4CAEC1CF}"/>
+                <a16:creationId xmlns:a16="http://schemas.microsoft.com/office/drawing/2014/main" id="{DA9750BD-DA78-42B2-B5A4-A84E29984CD9}"/>
               </a:ext>
               <a:ext uri="{C183D7F6-B498-43B3-948B-1728B52AA6E4}">
                 <adec:decorative xmlns:adec="http://schemas.microsoft.com/office/drawing/2017/decorative" val="1"/>
@@ -27818,10 +27958,10 @@
       </p:sp>
       <p:sp>
         <p:nvSpPr>
-          <p:cNvPr id="32" name="Rectangle 31">
+          <p:cNvPr id="48" name="Rectangle 47">
             <a:extLst>
               <a:ext uri="{FF2B5EF4-FFF2-40B4-BE49-F238E27FC236}">
-                <a16:creationId xmlns:a16="http://schemas.microsoft.com/office/drawing/2014/main" id="{5AF7891E-857B-435C-B27A-FAA12E672772}"/>
+                <a16:creationId xmlns:a16="http://schemas.microsoft.com/office/drawing/2014/main" id="{C606A26C-8C0A-411E-BF72-5EE06043487A}"/>
               </a:ext>
               <a:ext uri="{C183D7F6-B498-43B3-948B-1728B52AA6E4}">
                 <adec:decorative xmlns:adec="http://schemas.microsoft.com/office/drawing/2017/decorative" val="1"/>
@@ -27842,7 +27982,7 @@
         <p:spPr>
           <a:xfrm>
             <a:off x="0" y="0"/>
-            <a:ext cx="12192000" cy="1150467"/>
+            <a:ext cx="3048000" cy="6858000"/>
           </a:xfrm>
           <a:prstGeom prst="rect">
             <a:avLst/>
@@ -27878,10 +28018,10 @@
       </p:sp>
       <p:sp>
         <p:nvSpPr>
-          <p:cNvPr id="25" name="Title 24">
+          <p:cNvPr id="41" name="Title 40">
             <a:extLst>
               <a:ext uri="{FF2B5EF4-FFF2-40B4-BE49-F238E27FC236}">
-                <a16:creationId xmlns:a16="http://schemas.microsoft.com/office/drawing/2014/main" id="{330F6403-11BB-440A-81D1-11DAFA7ABF5D}"/>
+                <a16:creationId xmlns:a16="http://schemas.microsoft.com/office/drawing/2014/main" id="{0622F47C-D986-4C50-BD14-2C1E537C27FB}"/>
               </a:ext>
             </a:extLst>
           </p:cNvPr>
@@ -27894,38 +28034,38 @@
         </p:nvSpPr>
         <p:spPr>
           <a:xfrm>
-            <a:off x="990599" y="190500"/>
-            <a:ext cx="10336013" cy="773777"/>
+            <a:off x="126281" y="637886"/>
+            <a:ext cx="1826375" cy="1567986"/>
           </a:xfrm>
         </p:spPr>
         <p:txBody>
-          <a:bodyPr vert="horz" lIns="91440" tIns="45720" rIns="91440" bIns="45720" rtlCol="0" anchor="ctr">
+          <a:bodyPr vert="horz" lIns="91440" tIns="45720" rIns="91440" bIns="45720" rtlCol="0" anchor="t">
             <a:normAutofit/>
           </a:bodyPr>
           <a:lstStyle/>
           <a:p>
-            <a:pPr>
+            <a:pPr algn="l">
               <a:lnSpc>
                 <a:spcPct val="90000"/>
               </a:lnSpc>
             </a:pPr>
             <a:r>
-              <a:rPr lang="en-US" sz="4300" spc="-40" dirty="0">
+              <a:rPr lang="en-US" sz="2800" spc="-40" dirty="0">
                 <a:solidFill>
                   <a:srgbClr val="FFFFFF"/>
                 </a:solidFill>
               </a:rPr>
-              <a:t>Unique Selling Point</a:t>
+              <a:t>Market Potential</a:t>
             </a:r>
           </a:p>
         </p:txBody>
       </p:sp>
       <p:sp>
         <p:nvSpPr>
-          <p:cNvPr id="4" name="Footer Placeholder 3">
+          <p:cNvPr id="2" name="Footer Placeholder 1">
             <a:extLst>
               <a:ext uri="{FF2B5EF4-FFF2-40B4-BE49-F238E27FC236}">
-                <a16:creationId xmlns:a16="http://schemas.microsoft.com/office/drawing/2014/main" id="{1C63F48C-BFC1-4227-8BB0-C06C473D6F55}"/>
+                <a16:creationId xmlns:a16="http://schemas.microsoft.com/office/drawing/2014/main" id="{2C20C49D-5E38-4E7C-A240-4B2D015F3AC7}"/>
               </a:ext>
             </a:extLst>
           </p:cNvPr>
@@ -27939,7 +28079,7 @@
         <p:spPr>
           <a:xfrm>
             <a:off x="201168" y="6356350"/>
-            <a:ext cx="4837176" cy="365125"/>
+            <a:ext cx="2713482" cy="365125"/>
           </a:xfrm>
         </p:spPr>
         <p:txBody>
@@ -27956,7 +28096,7 @@
             <a:r>
               <a:rPr lang="en-US" kern="1200" noProof="0">
                 <a:solidFill>
-                  <a:schemeClr val="tx1"/>
+                  <a:srgbClr val="FFFFFF"/>
                 </a:solidFill>
                 <a:latin typeface="+mn-lt"/>
                 <a:ea typeface="+mn-ea"/>
@@ -27967,12 +28107,260 @@
           </a:p>
         </p:txBody>
       </p:sp>
+      <p:pic>
+        <p:nvPicPr>
+          <p:cNvPr id="30" name="Picture 29">
+            <a:extLst>
+              <a:ext uri="{FF2B5EF4-FFF2-40B4-BE49-F238E27FC236}">
+                <a16:creationId xmlns:a16="http://schemas.microsoft.com/office/drawing/2014/main" id="{87246A19-C527-A977-2EF3-43FB2869CF04}"/>
+              </a:ext>
+            </a:extLst>
+          </p:cNvPr>
+          <p:cNvPicPr>
+            <a:picLocks noChangeAspect="1"/>
+          </p:cNvPicPr>
+          <p:nvPr/>
+        </p:nvPicPr>
+        <p:blipFill>
+          <a:blip r:embed="rId2"/>
+          <a:stretch>
+            <a:fillRect/>
+          </a:stretch>
+        </p:blipFill>
+        <p:spPr>
+          <a:xfrm>
+            <a:off x="1897498" y="0"/>
+            <a:ext cx="1375162" cy="6858000"/>
+          </a:xfrm>
+          <a:prstGeom prst="rect">
+            <a:avLst/>
+          </a:prstGeom>
+        </p:spPr>
+      </p:pic>
+      <p:sp>
+        <p:nvSpPr>
+          <p:cNvPr id="25" name="TextBox 24">
+            <a:extLst>
+              <a:ext uri="{FF2B5EF4-FFF2-40B4-BE49-F238E27FC236}">
+                <a16:creationId xmlns:a16="http://schemas.microsoft.com/office/drawing/2014/main" id="{6FDEE004-1220-7B14-EDF9-5227528EB89D}"/>
+              </a:ext>
+            </a:extLst>
+          </p:cNvPr>
+          <p:cNvSpPr txBox="1"/>
+          <p:nvPr/>
+        </p:nvSpPr>
+        <p:spPr>
+          <a:xfrm>
+            <a:off x="2190994" y="363675"/>
+            <a:ext cx="3318320" cy="3104510"/>
+          </a:xfrm>
+          <a:prstGeom prst="rect">
+            <a:avLst/>
+          </a:prstGeom>
+        </p:spPr>
+        <p:txBody>
+          <a:bodyPr vert="horz" lIns="91440" tIns="45720" rIns="91440" bIns="45720" rtlCol="0">
+            <a:normAutofit/>
+          </a:bodyPr>
+          <a:lstStyle/>
+          <a:p>
+            <a:pPr>
+              <a:lnSpc>
+                <a:spcPct val="110000"/>
+              </a:lnSpc>
+              <a:spcAft>
+                <a:spcPts val="600"/>
+              </a:spcAft>
+            </a:pPr>
+            <a:r>
+              <a:rPr lang="en-US" sz="1600" spc="-20" dirty="0"/>
+              <a:t>Revenue from in-app purchases and advertisements across regions.</a:t>
+            </a:r>
+          </a:p>
+          <a:p>
+            <a:pPr>
+              <a:lnSpc>
+                <a:spcPct val="110000"/>
+              </a:lnSpc>
+              <a:spcAft>
+                <a:spcPts val="600"/>
+              </a:spcAft>
+            </a:pPr>
+            <a:endParaRPr lang="en-US" sz="1600" spc="-20" dirty="0"/>
+          </a:p>
+          <a:p>
+            <a:pPr>
+              <a:lnSpc>
+                <a:spcPct val="110000"/>
+              </a:lnSpc>
+              <a:spcAft>
+                <a:spcPts val="600"/>
+              </a:spcAft>
+            </a:pPr>
+            <a:r>
+              <a:rPr lang="en-US" sz="1600" spc="-20" dirty="0"/>
+              <a:t>From 2020 to 2021:</a:t>
+            </a:r>
+          </a:p>
+          <a:p>
+            <a:pPr marL="285750" indent="-285750">
+              <a:lnSpc>
+                <a:spcPct val="110000"/>
+              </a:lnSpc>
+              <a:spcAft>
+                <a:spcPts val="600"/>
+              </a:spcAft>
+              <a:buFont typeface="Arial" panose="020B0604020202020204" pitchFamily="34" charset="0"/>
+              <a:buChar char="•"/>
+            </a:pPr>
+            <a:r>
+              <a:rPr lang="en-US" sz="1600" spc="-20" dirty="0"/>
+              <a:t>Total revenue grown by 30%</a:t>
+            </a:r>
+          </a:p>
+          <a:p>
+            <a:pPr>
+              <a:lnSpc>
+                <a:spcPct val="110000"/>
+              </a:lnSpc>
+              <a:spcAft>
+                <a:spcPts val="600"/>
+              </a:spcAft>
+            </a:pPr>
+            <a:r>
+              <a:rPr lang="en-US" sz="1600" spc="-20" dirty="0"/>
+              <a:t>From 2019 to 2021:</a:t>
+            </a:r>
+          </a:p>
+          <a:p>
+            <a:pPr marL="285750" indent="-285750">
+              <a:lnSpc>
+                <a:spcPct val="110000"/>
+              </a:lnSpc>
+              <a:spcAft>
+                <a:spcPts val="600"/>
+              </a:spcAft>
+              <a:buFont typeface="Arial" panose="020B0604020202020204" pitchFamily="34" charset="0"/>
+              <a:buChar char="•"/>
+            </a:pPr>
+            <a:r>
+              <a:rPr lang="en-US" sz="1600" spc="-20" dirty="0"/>
+              <a:t>EU Ad revenue grown by 98%</a:t>
+            </a:r>
+          </a:p>
+          <a:p>
+            <a:pPr marL="285750" indent="-285750">
+              <a:lnSpc>
+                <a:spcPct val="110000"/>
+              </a:lnSpc>
+              <a:spcAft>
+                <a:spcPts val="600"/>
+              </a:spcAft>
+              <a:buFont typeface="Arial" panose="020B0604020202020204" pitchFamily="34" charset="0"/>
+              <a:buChar char="•"/>
+            </a:pPr>
+            <a:r>
+              <a:rPr lang="en-US" sz="1600" spc="-20" dirty="0"/>
+              <a:t>EU IAP grown by 418%</a:t>
+            </a:r>
+          </a:p>
+        </p:txBody>
+      </p:sp>
+      <p:pic>
+        <p:nvPicPr>
+          <p:cNvPr id="7" name="Picture 6">
+            <a:extLst>
+              <a:ext uri="{FF2B5EF4-FFF2-40B4-BE49-F238E27FC236}">
+                <a16:creationId xmlns:a16="http://schemas.microsoft.com/office/drawing/2014/main" id="{181A880E-EED8-078C-7AC8-4F7B918D200A}"/>
+              </a:ext>
+            </a:extLst>
+          </p:cNvPr>
+          <p:cNvPicPr>
+            <a:picLocks noChangeAspect="1"/>
+          </p:cNvPicPr>
+          <p:nvPr/>
+        </p:nvPicPr>
+        <p:blipFill rotWithShape="1">
+          <a:blip r:embed="rId3"/>
+          <a:srcRect r="19087"/>
+          <a:stretch/>
+        </p:blipFill>
+        <p:spPr>
+          <a:xfrm>
+            <a:off x="1952657" y="3561940"/>
+            <a:ext cx="4574344" cy="3202304"/>
+          </a:xfrm>
+          <a:prstGeom prst="rect">
+            <a:avLst/>
+          </a:prstGeom>
+        </p:spPr>
+      </p:pic>
+      <p:pic>
+        <p:nvPicPr>
+          <p:cNvPr id="9" name="Picture 8">
+            <a:extLst>
+              <a:ext uri="{FF2B5EF4-FFF2-40B4-BE49-F238E27FC236}">
+                <a16:creationId xmlns:a16="http://schemas.microsoft.com/office/drawing/2014/main" id="{BE1F526F-368B-C0AE-D8B3-CCCB4EF0CB64}"/>
+              </a:ext>
+            </a:extLst>
+          </p:cNvPr>
+          <p:cNvPicPr>
+            <a:picLocks noChangeAspect="1"/>
+          </p:cNvPicPr>
+          <p:nvPr/>
+        </p:nvPicPr>
+        <p:blipFill>
+          <a:blip r:embed="rId4"/>
+          <a:stretch>
+            <a:fillRect/>
+          </a:stretch>
+        </p:blipFill>
+        <p:spPr>
+          <a:xfrm>
+            <a:off x="6595793" y="3332636"/>
+            <a:ext cx="5469928" cy="3431606"/>
+          </a:xfrm>
+          <a:prstGeom prst="rect">
+            <a:avLst/>
+          </a:prstGeom>
+        </p:spPr>
+      </p:pic>
+      <p:pic>
+        <p:nvPicPr>
+          <p:cNvPr id="11" name="Picture 10">
+            <a:extLst>
+              <a:ext uri="{FF2B5EF4-FFF2-40B4-BE49-F238E27FC236}">
+                <a16:creationId xmlns:a16="http://schemas.microsoft.com/office/drawing/2014/main" id="{4222A479-805C-BD1F-5299-04E5BCFFEB6F}"/>
+              </a:ext>
+            </a:extLst>
+          </p:cNvPr>
+          <p:cNvPicPr>
+            <a:picLocks noChangeAspect="1"/>
+          </p:cNvPicPr>
+          <p:nvPr/>
+        </p:nvPicPr>
+        <p:blipFill>
+          <a:blip r:embed="rId5"/>
+          <a:stretch>
+            <a:fillRect/>
+          </a:stretch>
+        </p:blipFill>
+        <p:spPr>
+          <a:xfrm>
+            <a:off x="6595793" y="93758"/>
+            <a:ext cx="5469926" cy="3212396"/>
+          </a:xfrm>
+          <a:prstGeom prst="rect">
+            <a:avLst/>
+          </a:prstGeom>
+        </p:spPr>
+      </p:pic>
       <p:sp>
         <p:nvSpPr>
           <p:cNvPr id="3" name="Date Placeholder 2">
             <a:extLst>
               <a:ext uri="{FF2B5EF4-FFF2-40B4-BE49-F238E27FC236}">
-                <a16:creationId xmlns:a16="http://schemas.microsoft.com/office/drawing/2014/main" id="{1E532E67-6C01-41FF-AA5B-AEEE3DFA51CB}"/>
+                <a16:creationId xmlns:a16="http://schemas.microsoft.com/office/drawing/2014/main" id="{9CE6D34A-9686-45B2-97D0-AD20167B2D54}"/>
               </a:ext>
             </a:extLst>
           </p:cNvPr>
@@ -28004,16 +28392,15 @@
               <a:rPr lang="en-US" noProof="0" dirty="0"/>
               <a:t>2022</a:t>
             </a:r>
-            <a:endParaRPr lang="en-US" noProof="0"/>
           </a:p>
         </p:txBody>
       </p:sp>
       <p:sp>
         <p:nvSpPr>
-          <p:cNvPr id="5" name="Slide Number Placeholder 4">
+          <p:cNvPr id="4" name="Slide Number Placeholder 3">
             <a:extLst>
               <a:ext uri="{FF2B5EF4-FFF2-40B4-BE49-F238E27FC236}">
-                <a16:creationId xmlns:a16="http://schemas.microsoft.com/office/drawing/2014/main" id="{AA33C4C9-9778-4A59-9001-6EC6F52349CA}"/>
+                <a16:creationId xmlns:a16="http://schemas.microsoft.com/office/drawing/2014/main" id="{AC0EC6D8-4D66-4B16-AD3F-2850D613518A}"/>
               </a:ext>
             </a:extLst>
           </p:cNvPr>
@@ -28050,48 +28437,14 @@
               </a:pPr>
               <a:t>8</a:t>
             </a:fld>
-            <a:endParaRPr lang="en-US" noProof="0"/>
+            <a:endParaRPr lang="en-US" noProof="0" dirty="0"/>
           </a:p>
         </p:txBody>
       </p:sp>
-      <p:graphicFrame>
-        <p:nvGraphicFramePr>
-          <p:cNvPr id="20" name="Content Placeholder 3">
-            <a:extLst>
-              <a:ext uri="{FF2B5EF4-FFF2-40B4-BE49-F238E27FC236}">
-                <a16:creationId xmlns:a16="http://schemas.microsoft.com/office/drawing/2014/main" id="{76386ECC-44D1-4D37-AF78-36503EACC84D}"/>
-              </a:ext>
-              <a:ext uri="{C183D7F6-B498-43B3-948B-1728B52AA6E4}">
-                <adec:decorative xmlns:adec="http://schemas.microsoft.com/office/drawing/2017/decorative" val="1"/>
-              </a:ext>
-            </a:extLst>
-          </p:cNvPr>
-          <p:cNvGraphicFramePr>
-            <a:graphicFrameLocks noGrp="1"/>
-          </p:cNvGraphicFramePr>
-          <p:nvPr>
-            <p:ph sz="quarter" idx="14"/>
-            <p:extLst>
-              <p:ext uri="{D42A27DB-BD31-4B8C-83A1-F6EECF244321}">
-                <p14:modId xmlns:p14="http://schemas.microsoft.com/office/powerpoint/2010/main" val="1906694569"/>
-              </p:ext>
-            </p:extLst>
-          </p:nvPr>
-        </p:nvGraphicFramePr>
-        <p:xfrm>
-          <a:off x="649288" y="1984375"/>
-          <a:ext cx="10552112" cy="4197350"/>
-        </p:xfrm>
-        <a:graphic>
-          <a:graphicData uri="http://schemas.openxmlformats.org/drawingml/2006/diagram">
-            <dgm:relIds xmlns:dgm="http://schemas.openxmlformats.org/drawingml/2006/diagram" xmlns:r="http://schemas.openxmlformats.org/officeDocument/2006/relationships" r:dm="rId2" r:lo="rId3" r:qs="rId4" r:cs="rId5"/>
-          </a:graphicData>
-        </a:graphic>
-      </p:graphicFrame>
     </p:spTree>
     <p:extLst>
       <p:ext uri="{BB962C8B-B14F-4D97-AF65-F5344CB8AC3E}">
-        <p14:creationId xmlns:p14="http://schemas.microsoft.com/office/powerpoint/2010/main" val="1351671334"/>
+        <p14:creationId xmlns:p14="http://schemas.microsoft.com/office/powerpoint/2010/main" val="3546298949"/>
       </p:ext>
     </p:extLst>
   </p:cSld>
@@ -28146,6 +28499,7 @@
           </a:bodyPr>
           <a:lstStyle/>
           <a:p>
+            <a:pPr algn="l"/>
             <a:r>
               <a:rPr lang="en-US" dirty="0"/>
               <a:t>Marketing Strategy</a:t>
@@ -30064,6 +30418,15 @@
 </file>
 
 <file path=customXml/item1.xml><?xml version="1.0" encoding="utf-8"?>
+<?mso-contentType ?>
+<FormTemplates xmlns="http://schemas.microsoft.com/sharepoint/v3/contenttype/forms">
+  <Display>DocumentLibraryForm</Display>
+  <Edit>DocumentLibraryForm</Edit>
+  <New>DocumentLibraryForm</New>
+</FormTemplates>
+</file>
+
+<file path=customXml/item2.xml><?xml version="1.0" encoding="utf-8"?>
 <p:properties xmlns:p="http://schemas.microsoft.com/office/2006/metadata/properties" xmlns:xsi="http://www.w3.org/2001/XMLSchema-instance" xmlns:pc="http://schemas.microsoft.com/office/infopath/2007/PartnerControls">
   <documentManagement>
     <Status xmlns="71af3243-3dd4-4a8d-8c0d-dd76da1f02a5">Not started</Status>
@@ -30080,15 +30443,6 @@
     <MediaServiceKeyPoints xmlns="71af3243-3dd4-4a8d-8c0d-dd76da1f02a5" xsi:nil="true"/>
   </documentManagement>
 </p:properties>
-</file>
-
-<file path=customXml/item2.xml><?xml version="1.0" encoding="utf-8"?>
-<?mso-contentType ?>
-<FormTemplates xmlns="http://schemas.microsoft.com/sharepoint/v3/contenttype/forms">
-  <Display>DocumentLibraryForm</Display>
-  <Edit>DocumentLibraryForm</Edit>
-  <New>DocumentLibraryForm</New>
-</FormTemplates>
 </file>
 
 <file path=customXml/item3.xml><?xml version="1.0" encoding="utf-8"?>
@@ -30368,6 +30722,14 @@
 </file>
 
 <file path=customXml/itemProps1.xml><?xml version="1.0" encoding="utf-8"?>
+<ds:datastoreItem xmlns:ds="http://schemas.openxmlformats.org/officeDocument/2006/customXml" ds:itemID="{A5CCB28C-7D26-4A36-9CFC-D739C28F3D18}">
+  <ds:schemaRefs>
+    <ds:schemaRef ds:uri="http://schemas.microsoft.com/sharepoint/v3/contenttype/forms"/>
+  </ds:schemaRefs>
+</ds:datastoreItem>
+</file>
+
+<file path=customXml/itemProps2.xml><?xml version="1.0" encoding="utf-8"?>
 <ds:datastoreItem xmlns:ds="http://schemas.openxmlformats.org/officeDocument/2006/customXml" ds:itemID="{08757C30-AE9A-4680-90EB-19D282EC2B7C}">
   <ds:schemaRefs>
     <ds:schemaRef ds:uri="http://schemas.microsoft.com/office/2006/metadata/properties"/>
@@ -30375,14 +30737,6 @@
     <ds:schemaRef ds:uri="71af3243-3dd4-4a8d-8c0d-dd76da1f02a5"/>
     <ds:schemaRef ds:uri="http://schemas.microsoft.com/sharepoint/v3"/>
     <ds:schemaRef ds:uri="230e9df3-be65-4c73-a93b-d1236ebd677e"/>
-  </ds:schemaRefs>
-</ds:datastoreItem>
-</file>
-
-<file path=customXml/itemProps2.xml><?xml version="1.0" encoding="utf-8"?>
-<ds:datastoreItem xmlns:ds="http://schemas.openxmlformats.org/officeDocument/2006/customXml" ds:itemID="{A5CCB28C-7D26-4A36-9CFC-D739C28F3D18}">
-  <ds:schemaRefs>
-    <ds:schemaRef ds:uri="http://schemas.microsoft.com/sharepoint/v3/contenttype/forms"/>
   </ds:schemaRefs>
 </ds:datastoreItem>
 </file>

</xml_diff>